<commit_message>
updated V to v in 15th slide
</commit_message>
<xml_diff>
--- a/Vue-js_team06.pptx
+++ b/Vue-js_team06.pptx
@@ -4,6 +4,9 @@
   <p:sldMasterIdLst>
     <p:sldMasterId id="2147483648" r:id="rId1"/>
   </p:sldMasterIdLst>
+  <p:notesMasterIdLst>
+    <p:notesMasterId r:id="rId21"/>
+  </p:notesMasterIdLst>
   <p:sldIdLst>
     <p:sldId id="256" r:id="rId2"/>
     <p:sldId id="257" r:id="rId3"/>
@@ -141,6 +144,440 @@
 </p:presentation>
 </file>
 
+<file path=ppt/notesMasters/notesMaster1.xml><?xml version="1.0" encoding="utf-8"?>
+<p:notesMaster xmlns:a="http://schemas.openxmlformats.org/drawingml/2006/main" xmlns:r="http://schemas.openxmlformats.org/officeDocument/2006/relationships" xmlns:p="http://schemas.openxmlformats.org/presentationml/2006/main">
+  <p:cSld>
+    <p:bg>
+      <p:bgRef idx="1001">
+        <a:schemeClr val="bg1"/>
+      </p:bgRef>
+    </p:bg>
+    <p:spTree>
+      <p:nvGrpSpPr>
+        <p:cNvPr id="1" name=""/>
+        <p:cNvGrpSpPr/>
+        <p:nvPr/>
+      </p:nvGrpSpPr>
+      <p:grpSpPr>
+        <a:xfrm>
+          <a:off x="0" y="0"/>
+          <a:ext cx="0" cy="0"/>
+          <a:chOff x="0" y="0"/>
+          <a:chExt cx="0" cy="0"/>
+        </a:xfrm>
+      </p:grpSpPr>
+      <p:sp>
+        <p:nvSpPr>
+          <p:cNvPr id="2" name="Header Placeholder 1"/>
+          <p:cNvSpPr>
+            <a:spLocks noGrp="1"/>
+          </p:cNvSpPr>
+          <p:nvPr>
+            <p:ph type="hdr" sz="quarter"/>
+          </p:nvPr>
+        </p:nvSpPr>
+        <p:spPr>
+          <a:xfrm>
+            <a:off x="0" y="0"/>
+            <a:ext cx="3962400" cy="257175"/>
+          </a:xfrm>
+          <a:prstGeom prst="rect">
+            <a:avLst/>
+          </a:prstGeom>
+        </p:spPr>
+        <p:txBody>
+          <a:bodyPr vert="horz" lIns="91440" tIns="45720" rIns="91440" bIns="45720" rtlCol="0"/>
+          <a:lstStyle>
+            <a:lvl1pPr algn="l">
+              <a:defRPr sz="1200"/>
+            </a:lvl1pPr>
+          </a:lstStyle>
+          <a:p>
+            <a:endParaRPr lang="en-US"/>
+          </a:p>
+        </p:txBody>
+      </p:sp>
+      <p:sp>
+        <p:nvSpPr>
+          <p:cNvPr id="3" name="Date Placeholder 2"/>
+          <p:cNvSpPr>
+            <a:spLocks noGrp="1"/>
+          </p:cNvSpPr>
+          <p:nvPr>
+            <p:ph type="dt" idx="1"/>
+          </p:nvPr>
+        </p:nvSpPr>
+        <p:spPr>
+          <a:xfrm>
+            <a:off x="5180013" y="0"/>
+            <a:ext cx="3962400" cy="257175"/>
+          </a:xfrm>
+          <a:prstGeom prst="rect">
+            <a:avLst/>
+          </a:prstGeom>
+        </p:spPr>
+        <p:txBody>
+          <a:bodyPr vert="horz" lIns="91440" tIns="45720" rIns="91440" bIns="45720" rtlCol="0"/>
+          <a:lstStyle>
+            <a:lvl1pPr algn="r">
+              <a:defRPr sz="1200"/>
+            </a:lvl1pPr>
+          </a:lstStyle>
+          <a:p>
+            <a:fld id="{2CD817D8-1F7E-4730-8F3E-511AFD600A36}" type="datetimeFigureOut">
+              <a:rPr lang="en-US" smtClean="0"/>
+              <a:t>10/28/2019</a:t>
+            </a:fld>
+            <a:endParaRPr lang="en-US"/>
+          </a:p>
+        </p:txBody>
+      </p:sp>
+      <p:sp>
+        <p:nvSpPr>
+          <p:cNvPr id="4" name="Slide Image Placeholder 3"/>
+          <p:cNvSpPr>
+            <a:spLocks noGrp="1" noRot="1" noChangeAspect="1"/>
+          </p:cNvSpPr>
+          <p:nvPr>
+            <p:ph type="sldImg" idx="2"/>
+          </p:nvPr>
+        </p:nvSpPr>
+        <p:spPr>
+          <a:xfrm>
+            <a:off x="3028950" y="642938"/>
+            <a:ext cx="3086100" cy="1736725"/>
+          </a:xfrm>
+          <a:prstGeom prst="rect">
+            <a:avLst/>
+          </a:prstGeom>
+          <a:noFill/>
+          <a:ln w="12700">
+            <a:solidFill>
+              <a:prstClr val="black"/>
+            </a:solidFill>
+          </a:ln>
+        </p:spPr>
+        <p:txBody>
+          <a:bodyPr vert="horz" lIns="91440" tIns="45720" rIns="91440" bIns="45720" rtlCol="0" anchor="ctr"/>
+          <a:lstStyle/>
+          <a:p>
+            <a:endParaRPr lang="en-US"/>
+          </a:p>
+        </p:txBody>
+      </p:sp>
+      <p:sp>
+        <p:nvSpPr>
+          <p:cNvPr id="5" name="Notes Placeholder 4"/>
+          <p:cNvSpPr>
+            <a:spLocks noGrp="1"/>
+          </p:cNvSpPr>
+          <p:nvPr>
+            <p:ph type="body" sz="quarter" idx="3"/>
+          </p:nvPr>
+        </p:nvSpPr>
+        <p:spPr>
+          <a:xfrm>
+            <a:off x="914400" y="2474913"/>
+            <a:ext cx="7315200" cy="2025650"/>
+          </a:xfrm>
+          <a:prstGeom prst="rect">
+            <a:avLst/>
+          </a:prstGeom>
+        </p:spPr>
+        <p:txBody>
+          <a:bodyPr vert="horz" lIns="91440" tIns="45720" rIns="91440" bIns="45720" rtlCol="0"/>
+          <a:lstStyle/>
+          <a:p>
+            <a:pPr lvl="0"/>
+            <a:r>
+              <a:rPr lang="en-US" smtClean="0"/>
+              <a:t>Edit Master text styles</a:t>
+            </a:r>
+          </a:p>
+          <a:p>
+            <a:pPr lvl="1"/>
+            <a:r>
+              <a:rPr lang="en-US" smtClean="0"/>
+              <a:t>Second level</a:t>
+            </a:r>
+          </a:p>
+          <a:p>
+            <a:pPr lvl="2"/>
+            <a:r>
+              <a:rPr lang="en-US" smtClean="0"/>
+              <a:t>Third level</a:t>
+            </a:r>
+          </a:p>
+          <a:p>
+            <a:pPr lvl="3"/>
+            <a:r>
+              <a:rPr lang="en-US" smtClean="0"/>
+              <a:t>Fourth level</a:t>
+            </a:r>
+          </a:p>
+          <a:p>
+            <a:pPr lvl="4"/>
+            <a:r>
+              <a:rPr lang="en-US" smtClean="0"/>
+              <a:t>Fifth level</a:t>
+            </a:r>
+            <a:endParaRPr lang="en-US"/>
+          </a:p>
+        </p:txBody>
+      </p:sp>
+      <p:sp>
+        <p:nvSpPr>
+          <p:cNvPr id="6" name="Footer Placeholder 5"/>
+          <p:cNvSpPr>
+            <a:spLocks noGrp="1"/>
+          </p:cNvSpPr>
+          <p:nvPr>
+            <p:ph type="ftr" sz="quarter" idx="4"/>
+          </p:nvPr>
+        </p:nvSpPr>
+        <p:spPr>
+          <a:xfrm>
+            <a:off x="0" y="4886325"/>
+            <a:ext cx="3962400" cy="257175"/>
+          </a:xfrm>
+          <a:prstGeom prst="rect">
+            <a:avLst/>
+          </a:prstGeom>
+        </p:spPr>
+        <p:txBody>
+          <a:bodyPr vert="horz" lIns="91440" tIns="45720" rIns="91440" bIns="45720" rtlCol="0" anchor="b"/>
+          <a:lstStyle>
+            <a:lvl1pPr algn="l">
+              <a:defRPr sz="1200"/>
+            </a:lvl1pPr>
+          </a:lstStyle>
+          <a:p>
+            <a:endParaRPr lang="en-US"/>
+          </a:p>
+        </p:txBody>
+      </p:sp>
+      <p:sp>
+        <p:nvSpPr>
+          <p:cNvPr id="7" name="Slide Number Placeholder 6"/>
+          <p:cNvSpPr>
+            <a:spLocks noGrp="1"/>
+          </p:cNvSpPr>
+          <p:nvPr>
+            <p:ph type="sldNum" sz="quarter" idx="5"/>
+          </p:nvPr>
+        </p:nvSpPr>
+        <p:spPr>
+          <a:xfrm>
+            <a:off x="5180013" y="4886325"/>
+            <a:ext cx="3962400" cy="257175"/>
+          </a:xfrm>
+          <a:prstGeom prst="rect">
+            <a:avLst/>
+          </a:prstGeom>
+        </p:spPr>
+        <p:txBody>
+          <a:bodyPr vert="horz" lIns="91440" tIns="45720" rIns="91440" bIns="45720" rtlCol="0" anchor="b"/>
+          <a:lstStyle>
+            <a:lvl1pPr algn="r">
+              <a:defRPr sz="1200"/>
+            </a:lvl1pPr>
+          </a:lstStyle>
+          <a:p>
+            <a:fld id="{547017CB-8C0E-4652-AA3F-32319466D369}" type="slidenum">
+              <a:rPr lang="en-US" smtClean="0"/>
+              <a:t>‹#›</a:t>
+            </a:fld>
+            <a:endParaRPr lang="en-US"/>
+          </a:p>
+        </p:txBody>
+      </p:sp>
+    </p:spTree>
+    <p:extLst>
+      <p:ext uri="{BB962C8B-B14F-4D97-AF65-F5344CB8AC3E}">
+        <p14:creationId xmlns:p14="http://schemas.microsoft.com/office/powerpoint/2010/main" val="2683503255"/>
+      </p:ext>
+    </p:extLst>
+  </p:cSld>
+  <p:clrMap bg1="lt1" tx1="dk1" bg2="lt2" tx2="dk2" accent1="accent1" accent2="accent2" accent3="accent3" accent4="accent4" accent5="accent5" accent6="accent6" hlink="hlink" folHlink="folHlink"/>
+  <p:notesStyle>
+    <a:lvl1pPr marL="0" algn="l" defTabSz="914400" rtl="0" eaLnBrk="1" latinLnBrk="0" hangingPunct="1">
+      <a:defRPr sz="1200" kern="1200">
+        <a:solidFill>
+          <a:schemeClr val="tx1"/>
+        </a:solidFill>
+        <a:latin typeface="+mn-lt"/>
+        <a:ea typeface="+mn-ea"/>
+        <a:cs typeface="+mn-cs"/>
+      </a:defRPr>
+    </a:lvl1pPr>
+    <a:lvl2pPr marL="457200" algn="l" defTabSz="914400" rtl="0" eaLnBrk="1" latinLnBrk="0" hangingPunct="1">
+      <a:defRPr sz="1200" kern="1200">
+        <a:solidFill>
+          <a:schemeClr val="tx1"/>
+        </a:solidFill>
+        <a:latin typeface="+mn-lt"/>
+        <a:ea typeface="+mn-ea"/>
+        <a:cs typeface="+mn-cs"/>
+      </a:defRPr>
+    </a:lvl2pPr>
+    <a:lvl3pPr marL="914400" algn="l" defTabSz="914400" rtl="0" eaLnBrk="1" latinLnBrk="0" hangingPunct="1">
+      <a:defRPr sz="1200" kern="1200">
+        <a:solidFill>
+          <a:schemeClr val="tx1"/>
+        </a:solidFill>
+        <a:latin typeface="+mn-lt"/>
+        <a:ea typeface="+mn-ea"/>
+        <a:cs typeface="+mn-cs"/>
+      </a:defRPr>
+    </a:lvl3pPr>
+    <a:lvl4pPr marL="1371600" algn="l" defTabSz="914400" rtl="0" eaLnBrk="1" latinLnBrk="0" hangingPunct="1">
+      <a:defRPr sz="1200" kern="1200">
+        <a:solidFill>
+          <a:schemeClr val="tx1"/>
+        </a:solidFill>
+        <a:latin typeface="+mn-lt"/>
+        <a:ea typeface="+mn-ea"/>
+        <a:cs typeface="+mn-cs"/>
+      </a:defRPr>
+    </a:lvl4pPr>
+    <a:lvl5pPr marL="1828800" algn="l" defTabSz="914400" rtl="0" eaLnBrk="1" latinLnBrk="0" hangingPunct="1">
+      <a:defRPr sz="1200" kern="1200">
+        <a:solidFill>
+          <a:schemeClr val="tx1"/>
+        </a:solidFill>
+        <a:latin typeface="+mn-lt"/>
+        <a:ea typeface="+mn-ea"/>
+        <a:cs typeface="+mn-cs"/>
+      </a:defRPr>
+    </a:lvl5pPr>
+    <a:lvl6pPr marL="2286000" algn="l" defTabSz="914400" rtl="0" eaLnBrk="1" latinLnBrk="0" hangingPunct="1">
+      <a:defRPr sz="1200" kern="1200">
+        <a:solidFill>
+          <a:schemeClr val="tx1"/>
+        </a:solidFill>
+        <a:latin typeface="+mn-lt"/>
+        <a:ea typeface="+mn-ea"/>
+        <a:cs typeface="+mn-cs"/>
+      </a:defRPr>
+    </a:lvl6pPr>
+    <a:lvl7pPr marL="2743200" algn="l" defTabSz="914400" rtl="0" eaLnBrk="1" latinLnBrk="0" hangingPunct="1">
+      <a:defRPr sz="1200" kern="1200">
+        <a:solidFill>
+          <a:schemeClr val="tx1"/>
+        </a:solidFill>
+        <a:latin typeface="+mn-lt"/>
+        <a:ea typeface="+mn-ea"/>
+        <a:cs typeface="+mn-cs"/>
+      </a:defRPr>
+    </a:lvl7pPr>
+    <a:lvl8pPr marL="3200400" algn="l" defTabSz="914400" rtl="0" eaLnBrk="1" latinLnBrk="0" hangingPunct="1">
+      <a:defRPr sz="1200" kern="1200">
+        <a:solidFill>
+          <a:schemeClr val="tx1"/>
+        </a:solidFill>
+        <a:latin typeface="+mn-lt"/>
+        <a:ea typeface="+mn-ea"/>
+        <a:cs typeface="+mn-cs"/>
+      </a:defRPr>
+    </a:lvl8pPr>
+    <a:lvl9pPr marL="3657600" algn="l" defTabSz="914400" rtl="0" eaLnBrk="1" latinLnBrk="0" hangingPunct="1">
+      <a:defRPr sz="1200" kern="1200">
+        <a:solidFill>
+          <a:schemeClr val="tx1"/>
+        </a:solidFill>
+        <a:latin typeface="+mn-lt"/>
+        <a:ea typeface="+mn-ea"/>
+        <a:cs typeface="+mn-cs"/>
+      </a:defRPr>
+    </a:lvl9pPr>
+  </p:notesStyle>
+</p:notesMaster>
+</file>
+
+<file path=ppt/notesSlides/notesSlide1.xml><?xml version="1.0" encoding="utf-8"?>
+<p:notes xmlns:a="http://schemas.openxmlformats.org/drawingml/2006/main" xmlns:r="http://schemas.openxmlformats.org/officeDocument/2006/relationships" xmlns:p="http://schemas.openxmlformats.org/presentationml/2006/main">
+  <p:cSld>
+    <p:spTree>
+      <p:nvGrpSpPr>
+        <p:cNvPr id="1" name=""/>
+        <p:cNvGrpSpPr/>
+        <p:nvPr/>
+      </p:nvGrpSpPr>
+      <p:grpSpPr>
+        <a:xfrm>
+          <a:off x="0" y="0"/>
+          <a:ext cx="0" cy="0"/>
+          <a:chOff x="0" y="0"/>
+          <a:chExt cx="0" cy="0"/>
+        </a:xfrm>
+      </p:grpSpPr>
+      <p:sp>
+        <p:nvSpPr>
+          <p:cNvPr id="2" name="Slide Image Placeholder 1"/>
+          <p:cNvSpPr>
+            <a:spLocks noGrp="1" noRot="1" noChangeAspect="1"/>
+          </p:cNvSpPr>
+          <p:nvPr>
+            <p:ph type="sldImg"/>
+          </p:nvPr>
+        </p:nvSpPr>
+        <p:spPr/>
+      </p:sp>
+      <p:sp>
+        <p:nvSpPr>
+          <p:cNvPr id="3" name="Notes Placeholder 2"/>
+          <p:cNvSpPr>
+            <a:spLocks noGrp="1"/>
+          </p:cNvSpPr>
+          <p:nvPr>
+            <p:ph type="body" idx="1"/>
+          </p:nvPr>
+        </p:nvSpPr>
+        <p:spPr/>
+        <p:txBody>
+          <a:bodyPr/>
+          <a:lstStyle/>
+          <a:p>
+            <a:endParaRPr lang="en-US" dirty="0"/>
+          </a:p>
+        </p:txBody>
+      </p:sp>
+      <p:sp>
+        <p:nvSpPr>
+          <p:cNvPr id="4" name="Slide Number Placeholder 3"/>
+          <p:cNvSpPr>
+            <a:spLocks noGrp="1"/>
+          </p:cNvSpPr>
+          <p:nvPr>
+            <p:ph type="sldNum" sz="quarter" idx="10"/>
+          </p:nvPr>
+        </p:nvSpPr>
+        <p:spPr/>
+        <p:txBody>
+          <a:bodyPr/>
+          <a:lstStyle/>
+          <a:p>
+            <a:fld id="{547017CB-8C0E-4652-AA3F-32319466D369}" type="slidenum">
+              <a:rPr lang="en-US" smtClean="0"/>
+              <a:t>2</a:t>
+            </a:fld>
+            <a:endParaRPr lang="en-US"/>
+          </a:p>
+        </p:txBody>
+      </p:sp>
+    </p:spTree>
+    <p:extLst>
+      <p:ext uri="{BB962C8B-B14F-4D97-AF65-F5344CB8AC3E}">
+        <p14:creationId xmlns:p14="http://schemas.microsoft.com/office/powerpoint/2010/main" val="1813852057"/>
+      </p:ext>
+    </p:extLst>
+  </p:cSld>
+  <p:clrMapOvr>
+    <a:masterClrMapping/>
+  </p:clrMapOvr>
+</p:notes>
+</file>
+
 <file path=ppt/slideLayouts/slideLayout1.xml><?xml version="1.0" encoding="utf-8"?>
 <p:sldLayout xmlns:a="http://schemas.openxmlformats.org/drawingml/2006/main" xmlns:r="http://schemas.openxmlformats.org/officeDocument/2006/relationships" xmlns:p="http://schemas.openxmlformats.org/presentationml/2006/main" type="obj" preserve="1">
   <p:cSld name="Title Slide">
@@ -280,7 +717,7 @@
           <a:p>
             <a:fld id="{1D8BD707-D9CF-40AE-B4C6-C98DA3205C09}" type="datetimeFigureOut">
               <a:rPr lang="en-US"/>
-              <a:t>10/27/2019</a:t>
+              <a:t>10/28/2019</a:t>
             </a:fld>
             <a:endParaRPr lang="en-US"/>
           </a:p>
@@ -542,7 +979,7 @@
           <a:p>
             <a:fld id="{1D8BD707-D9CF-40AE-B4C6-C98DA3205C09}" type="datetimeFigureOut">
               <a:rPr lang="en-US"/>
-              <a:t>10/27/2019</a:t>
+              <a:t>10/28/2019</a:t>
             </a:fld>
             <a:endParaRPr lang="en-US"/>
           </a:p>
@@ -905,7 +1342,7 @@
           <a:p>
             <a:fld id="{1D8BD707-D9CF-40AE-B4C6-C98DA3205C09}" type="datetimeFigureOut">
               <a:rPr lang="en-US"/>
-              <a:t>10/27/2019</a:t>
+              <a:t>10/28/2019</a:t>
             </a:fld>
             <a:endParaRPr lang="en-US"/>
           </a:p>
@@ -1053,7 +1490,7 @@
           <a:p>
             <a:fld id="{1D8BD707-D9CF-40AE-B4C6-C98DA3205C09}" type="datetimeFigureOut">
               <a:rPr lang="en-US"/>
-              <a:t>10/27/2019</a:t>
+              <a:t>10/28/2019</a:t>
             </a:fld>
             <a:endParaRPr lang="en-US"/>
           </a:p>
@@ -1259,7 +1696,7 @@
           <a:p>
             <a:fld id="{1D8BD707-D9CF-40AE-B4C6-C98DA3205C09}" type="datetimeFigureOut">
               <a:rPr lang="en-US"/>
-              <a:t>10/27/2019</a:t>
+              <a:t>10/28/2019</a:t>
             </a:fld>
             <a:endParaRPr lang="en-US"/>
           </a:p>
@@ -1482,7 +1919,7 @@
           <a:p>
             <a:fld id="{1D8BD707-D9CF-40AE-B4C6-C98DA3205C09}" type="datetimeFigureOut">
               <a:rPr lang="en-US"/>
-              <a:t>10/27/2019</a:t>
+              <a:t>10/28/2019</a:t>
             </a:fld>
             <a:endParaRPr lang="en-US"/>
           </a:p>
@@ -1987,27 +2424,8 @@
                 <a:ea typeface="+mj-ea"/>
                 <a:cs typeface="Courier New" panose="02070309020205020404" pitchFamily="49" charset="0"/>
               </a:rPr>
-              <a:t>Vue.extend</a:t>
-            </a:r>
-            <a:r>
-              <a:rPr lang="en-US" sz="4000" spc="-450" dirty="0">
-                <a:solidFill>
-                  <a:srgbClr val="4FBF8C"/>
-                </a:solidFill>
-                <a:latin typeface="Courier New" panose="02070309020205020404" pitchFamily="49" charset="0"/>
-                <a:ea typeface="+mj-ea"/>
-                <a:cs typeface="Courier New" panose="02070309020205020404" pitchFamily="49" charset="0"/>
-              </a:rPr>
-              <a:t>()</a:t>
-            </a:r>
-            <a:endParaRPr lang="en-US" sz="4000" spc="-450" dirty="0">
-              <a:solidFill>
-                <a:srgbClr val="4FBF8C"/>
-              </a:solidFill>
-              <a:latin typeface="Courier New" panose="02070309020205020404" pitchFamily="49" charset="0"/>
-              <a:ea typeface="+mj-ea"/>
-              <a:cs typeface="Courier New" panose="02070309020205020404" pitchFamily="49" charset="0"/>
-            </a:endParaRPr>
+              <a:t>Vue.extend()</a:t>
+            </a:r>
           </a:p>
         </p:txBody>
       </p:sp>
@@ -2227,38 +2645,8 @@
                 <a:ea typeface="+mj-ea"/>
                 <a:cs typeface="Courier New" panose="02070309020205020404" pitchFamily="49" charset="0"/>
               </a:rPr>
-              <a:t>The Hello </a:t>
-            </a:r>
-            <a:r>
-              <a:rPr lang="en-US" sz="4000" spc="-450" dirty="0">
-                <a:solidFill>
-                  <a:srgbClr val="4FBF8C"/>
-                </a:solidFill>
-                <a:latin typeface="Courier New" panose="02070309020205020404" pitchFamily="49" charset="0"/>
-                <a:ea typeface="+mj-ea"/>
-                <a:cs typeface="Courier New" panose="02070309020205020404" pitchFamily="49" charset="0"/>
-              </a:rPr>
-              <a:t>world</a:t>
-            </a:r>
-            <a:r>
-              <a:rPr lang="en-US" sz="4000" spc="-450" dirty="0">
-                <a:solidFill>
-                  <a:srgbClr val="4FBF8C"/>
-                </a:solidFill>
-                <a:latin typeface="Courier New" panose="02070309020205020404" pitchFamily="49" charset="0"/>
-                <a:ea typeface="+mj-ea"/>
-                <a:cs typeface="Courier New" panose="02070309020205020404" pitchFamily="49" charset="0"/>
-              </a:rPr>
-              <a:t> app in vue.js</a:t>
-            </a:r>
-            <a:endParaRPr lang="en-US" sz="4000" spc="-450" dirty="0">
-              <a:solidFill>
-                <a:srgbClr val="4FBF8C"/>
-              </a:solidFill>
-              <a:latin typeface="Courier New" panose="02070309020205020404" pitchFamily="49" charset="0"/>
-              <a:ea typeface="+mj-ea"/>
-              <a:cs typeface="Courier New" panose="02070309020205020404" pitchFamily="49" charset="0"/>
-            </a:endParaRPr>
+              <a:t>The Hello world app in vue.js</a:t>
+            </a:r>
           </a:p>
         </p:txBody>
       </p:sp>
@@ -2957,14 +3345,6 @@
               </a:rPr>
               <a:t> Directives</a:t>
             </a:r>
-            <a:endParaRPr lang="en-US" sz="4000" spc="-450" dirty="0">
-              <a:solidFill>
-                <a:srgbClr val="4FBF8C"/>
-              </a:solidFill>
-              <a:latin typeface="Courier New" panose="02070309020205020404" pitchFamily="49" charset="0"/>
-              <a:ea typeface="+mj-ea"/>
-              <a:cs typeface="Courier New" panose="02070309020205020404" pitchFamily="49" charset="0"/>
-            </a:endParaRPr>
           </a:p>
         </p:txBody>
       </p:sp>
@@ -3277,14 +3657,7 @@
                 <a:latin typeface="Verdana" panose="020B0604030504040204" pitchFamily="34" charset="0"/>
                 <a:ea typeface="Verdana" panose="020B0604030504040204" pitchFamily="34" charset="0"/>
               </a:rPr>
-              <a:t>v</a:t>
-            </a:r>
-            <a:r>
-              <a:rPr lang="en-US" altLang="en-US" sz="1600" dirty="0" smtClean="0">
-                <a:latin typeface="Verdana" panose="020B0604030504040204" pitchFamily="34" charset="0"/>
-                <a:ea typeface="Verdana" panose="020B0604030504040204" pitchFamily="34" charset="0"/>
-              </a:rPr>
-              <a:t>-</a:t>
+              <a:t>v-</a:t>
             </a:r>
             <a:r>
               <a:rPr lang="en-US" altLang="en-US" sz="1600" dirty="0" err="1" smtClean="0">
@@ -3417,14 +3790,7 @@
                 <a:latin typeface="Verdana" panose="020B0604030504040204" pitchFamily="34" charset="0"/>
                 <a:ea typeface="Verdana" panose="020B0604030504040204" pitchFamily="34" charset="0"/>
               </a:rPr>
-              <a:t>v</a:t>
-            </a:r>
-            <a:r>
-              <a:rPr lang="en-US" altLang="en-US" sz="1600" dirty="0" smtClean="0">
-                <a:latin typeface="Verdana" panose="020B0604030504040204" pitchFamily="34" charset="0"/>
-                <a:ea typeface="Verdana" panose="020B0604030504040204" pitchFamily="34" charset="0"/>
-              </a:rPr>
-              <a:t>-</a:t>
+              <a:t>v-</a:t>
             </a:r>
             <a:r>
               <a:rPr lang="en-US" altLang="en-US" sz="1600" dirty="0" err="1" smtClean="0">
@@ -5403,12 +5769,23 @@
               <a:buChar char="•"/>
             </a:pPr>
             <a:r>
+              <a:rPr lang="en-US" altLang="en-US" sz="1400" dirty="0">
+                <a:latin typeface="Verdana" panose="020B0604030504040204" pitchFamily="34" charset="0"/>
+                <a:ea typeface="Verdana" panose="020B0604030504040204" pitchFamily="34" charset="0"/>
+              </a:rPr>
+              <a:t>v</a:t>
+            </a:r>
+            <a:r>
               <a:rPr lang="en-US" altLang="en-US" sz="1400" dirty="0" smtClean="0">
                 <a:latin typeface="Verdana" panose="020B0604030504040204" pitchFamily="34" charset="0"/>
                 <a:ea typeface="Verdana" panose="020B0604030504040204" pitchFamily="34" charset="0"/>
               </a:rPr>
-              <a:t>V-text</a:t>
-            </a:r>
+              <a:t>-text</a:t>
+            </a:r>
+            <a:endParaRPr lang="en-US" altLang="en-US" sz="1400" dirty="0" smtClean="0">
+              <a:latin typeface="Verdana" panose="020B0604030504040204" pitchFamily="34" charset="0"/>
+              <a:ea typeface="Verdana" panose="020B0604030504040204" pitchFamily="34" charset="0"/>
+            </a:endParaRPr>
           </a:p>
           <a:p>
             <a:pPr marL="742950" lvl="1" indent="-285750" eaLnBrk="0" fontAlgn="base" hangingPunct="0">
@@ -5421,6 +5798,13 @@
               <a:buFont typeface="Arial" panose="020B0604020202020204" pitchFamily="34" charset="0"/>
               <a:buChar char="•"/>
             </a:pPr>
+            <a:r>
+              <a:rPr lang="en-US" altLang="en-US" sz="1400" dirty="0">
+                <a:latin typeface="Verdana" panose="020B0604030504040204" pitchFamily="34" charset="0"/>
+                <a:ea typeface="Verdana" panose="020B0604030504040204" pitchFamily="34" charset="0"/>
+              </a:rPr>
+              <a:t>v</a:t>
+            </a:r>
             <a:r>
               <a:rPr kumimoji="0" lang="en-US" altLang="en-US" sz="1400" i="0" u="none" strike="noStrike" cap="none" normalizeH="0" baseline="0" dirty="0" smtClean="0">
                 <a:ln>
@@ -5433,8 +5817,19 @@
                 <a:latin typeface="Verdana" panose="020B0604030504040204" pitchFamily="34" charset="0"/>
                 <a:ea typeface="Verdana" panose="020B0604030504040204" pitchFamily="34" charset="0"/>
               </a:rPr>
-              <a:t>V-ref</a:t>
-            </a:r>
+              <a:t>-ref</a:t>
+            </a:r>
+            <a:endParaRPr kumimoji="0" lang="en-US" altLang="en-US" sz="1400" i="0" u="none" strike="noStrike" cap="none" normalizeH="0" baseline="0" dirty="0" smtClean="0">
+              <a:ln>
+                <a:noFill/>
+              </a:ln>
+              <a:solidFill>
+                <a:schemeClr val="tx1"/>
+              </a:solidFill>
+              <a:effectLst/>
+              <a:latin typeface="Verdana" panose="020B0604030504040204" pitchFamily="34" charset="0"/>
+              <a:ea typeface="Verdana" panose="020B0604030504040204" pitchFamily="34" charset="0"/>
+            </a:endParaRPr>
           </a:p>
           <a:p>
             <a:pPr marL="742950" lvl="1" indent="-285750" eaLnBrk="0" fontAlgn="base" hangingPunct="0">
@@ -5448,12 +5843,23 @@
               <a:buChar char="•"/>
             </a:pPr>
             <a:r>
+              <a:rPr lang="en-US" altLang="en-US" sz="1400" dirty="0">
+                <a:latin typeface="Verdana" panose="020B0604030504040204" pitchFamily="34" charset="0"/>
+                <a:ea typeface="Verdana" panose="020B0604030504040204" pitchFamily="34" charset="0"/>
+              </a:rPr>
+              <a:t>v</a:t>
+            </a:r>
+            <a:r>
               <a:rPr lang="en-US" altLang="en-US" sz="1400" dirty="0" smtClean="0">
                 <a:latin typeface="Verdana" panose="020B0604030504040204" pitchFamily="34" charset="0"/>
                 <a:ea typeface="Verdana" panose="020B0604030504040204" pitchFamily="34" charset="0"/>
               </a:rPr>
-              <a:t>V-transition</a:t>
-            </a:r>
+              <a:t>-transition</a:t>
+            </a:r>
+            <a:endParaRPr lang="en-US" altLang="en-US" sz="1400" dirty="0" smtClean="0">
+              <a:latin typeface="Verdana" panose="020B0604030504040204" pitchFamily="34" charset="0"/>
+              <a:ea typeface="Verdana" panose="020B0604030504040204" pitchFamily="34" charset="0"/>
+            </a:endParaRPr>
           </a:p>
           <a:p>
             <a:pPr marL="742950" lvl="1" indent="-285750" eaLnBrk="0" fontAlgn="base" hangingPunct="0">
@@ -5466,6 +5872,13 @@
               <a:buFont typeface="Arial" panose="020B0604020202020204" pitchFamily="34" charset="0"/>
               <a:buChar char="•"/>
             </a:pPr>
+            <a:r>
+              <a:rPr lang="en-US" altLang="en-US" sz="1400" dirty="0">
+                <a:latin typeface="Verdana" panose="020B0604030504040204" pitchFamily="34" charset="0"/>
+                <a:ea typeface="Verdana" panose="020B0604030504040204" pitchFamily="34" charset="0"/>
+              </a:rPr>
+              <a:t>v</a:t>
+            </a:r>
             <a:r>
               <a:rPr kumimoji="0" lang="en-US" altLang="en-US" sz="1400" i="0" u="none" strike="noStrike" cap="none" normalizeH="0" baseline="0" dirty="0" smtClean="0">
                 <a:ln>
@@ -5478,8 +5891,19 @@
                 <a:latin typeface="Verdana" panose="020B0604030504040204" pitchFamily="34" charset="0"/>
                 <a:ea typeface="Verdana" panose="020B0604030504040204" pitchFamily="34" charset="0"/>
               </a:rPr>
-              <a:t>V-pre</a:t>
-            </a:r>
+              <a:t>-pre</a:t>
+            </a:r>
+            <a:endParaRPr kumimoji="0" lang="en-US" altLang="en-US" sz="1400" i="0" u="none" strike="noStrike" cap="none" normalizeH="0" baseline="0" dirty="0" smtClean="0">
+              <a:ln>
+                <a:noFill/>
+              </a:ln>
+              <a:solidFill>
+                <a:schemeClr val="tx1"/>
+              </a:solidFill>
+              <a:effectLst/>
+              <a:latin typeface="Verdana" panose="020B0604030504040204" pitchFamily="34" charset="0"/>
+              <a:ea typeface="Verdana" panose="020B0604030504040204" pitchFamily="34" charset="0"/>
+            </a:endParaRPr>
           </a:p>
           <a:p>
             <a:pPr marL="742950" lvl="1" indent="-285750" eaLnBrk="0" fontAlgn="base" hangingPunct="0">
@@ -5493,12 +5917,23 @@
               <a:buChar char="•"/>
             </a:pPr>
             <a:r>
+              <a:rPr lang="en-US" altLang="en-US" sz="1400" dirty="0">
+                <a:latin typeface="Verdana" panose="020B0604030504040204" pitchFamily="34" charset="0"/>
+                <a:ea typeface="Verdana" panose="020B0604030504040204" pitchFamily="34" charset="0"/>
+              </a:rPr>
+              <a:t>v</a:t>
+            </a:r>
+            <a:r>
               <a:rPr lang="en-US" altLang="en-US" sz="1400" dirty="0" smtClean="0">
                 <a:latin typeface="Verdana" panose="020B0604030504040204" pitchFamily="34" charset="0"/>
                 <a:ea typeface="Verdana" panose="020B0604030504040204" pitchFamily="34" charset="0"/>
               </a:rPr>
-              <a:t>V-el</a:t>
-            </a:r>
+              <a:t>-el</a:t>
+            </a:r>
+            <a:endParaRPr lang="en-US" altLang="en-US" sz="1400" dirty="0" smtClean="0">
+              <a:latin typeface="Verdana" panose="020B0604030504040204" pitchFamily="34" charset="0"/>
+              <a:ea typeface="Verdana" panose="020B0604030504040204" pitchFamily="34" charset="0"/>
+            </a:endParaRPr>
           </a:p>
           <a:p>
             <a:pPr lvl="0" eaLnBrk="0" fontAlgn="base" hangingPunct="0">
@@ -6487,7 +6922,7 @@
           <p:nvPr/>
         </p:nvPicPr>
         <p:blipFill>
-          <a:blip r:embed="rId2" cstate="print">
+          <a:blip r:embed="rId3" cstate="print">
             <a:extLst>
               <a:ext uri="{28A0092B-C50C-407E-A947-70E740481C1C}">
                 <a14:useLocalDpi xmlns:a14="http://schemas.microsoft.com/office/drawing/2010/main" val="0"/>
@@ -6502,36 +6937,6 @@
           <a:xfrm>
             <a:off x="6064931" y="3092669"/>
             <a:ext cx="1250269" cy="1384081"/>
-          </a:xfrm>
-          <a:prstGeom prst="rect">
-            <a:avLst/>
-          </a:prstGeom>
-        </p:spPr>
-      </p:pic>
-      <p:pic>
-        <p:nvPicPr>
-          <p:cNvPr id="8" name="Picture 7"/>
-          <p:cNvPicPr>
-            <a:picLocks noChangeAspect="1"/>
-          </p:cNvPicPr>
-          <p:nvPr/>
-        </p:nvPicPr>
-        <p:blipFill>
-          <a:blip r:embed="rId3" cstate="print">
-            <a:extLst>
-              <a:ext uri="{28A0092B-C50C-407E-A947-70E740481C1C}">
-                <a14:useLocalDpi xmlns:a14="http://schemas.microsoft.com/office/drawing/2010/main" val="0"/>
-              </a:ext>
-            </a:extLst>
-          </a:blip>
-          <a:stretch>
-            <a:fillRect/>
-          </a:stretch>
-        </p:blipFill>
-        <p:spPr>
-          <a:xfrm>
-            <a:off x="901138" y="1047750"/>
-            <a:ext cx="1232462" cy="1320800"/>
           </a:xfrm>
           <a:prstGeom prst="rect">
             <a:avLst/>
@@ -6590,8 +6995,38 @@
         </p:blipFill>
         <p:spPr>
           <a:xfrm>
-            <a:off x="920969" y="3092668"/>
+            <a:off x="838200" y="3092668"/>
             <a:ext cx="1441231" cy="1441231"/>
+          </a:xfrm>
+          <a:prstGeom prst="rect">
+            <a:avLst/>
+          </a:prstGeom>
+        </p:spPr>
+      </p:pic>
+      <p:pic>
+        <p:nvPicPr>
+          <p:cNvPr id="4" name="Picture 3"/>
+          <p:cNvPicPr>
+            <a:picLocks noChangeAspect="1"/>
+          </p:cNvPicPr>
+          <p:nvPr/>
+        </p:nvPicPr>
+        <p:blipFill>
+          <a:blip r:embed="rId6" cstate="print">
+            <a:extLst>
+              <a:ext uri="{28A0092B-C50C-407E-A947-70E740481C1C}">
+                <a14:useLocalDpi xmlns:a14="http://schemas.microsoft.com/office/drawing/2010/main" val="0"/>
+              </a:ext>
+            </a:extLst>
+          </a:blip>
+          <a:stretch>
+            <a:fillRect/>
+          </a:stretch>
+        </p:blipFill>
+        <p:spPr>
+          <a:xfrm>
+            <a:off x="834194" y="977801"/>
+            <a:ext cx="1375606" cy="1488448"/>
           </a:xfrm>
           <a:prstGeom prst="rect">
             <a:avLst/>
@@ -8616,38 +9051,8 @@
                 <a:ea typeface="+mj-ea"/>
                 <a:cs typeface="Courier New" panose="02070309020205020404" pitchFamily="49" charset="0"/>
               </a:rPr>
-              <a:t>Components </a:t>
-            </a:r>
-            <a:r>
-              <a:rPr lang="en-US" sz="4000" spc="-450" dirty="0">
-                <a:solidFill>
-                  <a:srgbClr val="4FBF8C"/>
-                </a:solidFill>
-                <a:latin typeface="Courier New" panose="02070309020205020404" pitchFamily="49" charset="0"/>
-                <a:ea typeface="+mj-ea"/>
-                <a:cs typeface="Courier New" panose="02070309020205020404" pitchFamily="49" charset="0"/>
-              </a:rPr>
-              <a:t>continued</a:t>
-            </a:r>
-            <a:r>
-              <a:rPr lang="en-US" sz="4000" spc="-450" dirty="0">
-                <a:solidFill>
-                  <a:srgbClr val="4FBF8C"/>
-                </a:solidFill>
-                <a:latin typeface="Courier New" panose="02070309020205020404" pitchFamily="49" charset="0"/>
-                <a:ea typeface="+mj-ea"/>
-                <a:cs typeface="Courier New" panose="02070309020205020404" pitchFamily="49" charset="0"/>
-              </a:rPr>
-              <a:t>..</a:t>
-            </a:r>
-            <a:endParaRPr lang="en-US" sz="4000" spc="-450" dirty="0">
-              <a:solidFill>
-                <a:srgbClr val="4FBF8C"/>
-              </a:solidFill>
-              <a:latin typeface="Courier New" panose="02070309020205020404" pitchFamily="49" charset="0"/>
-              <a:ea typeface="+mj-ea"/>
-              <a:cs typeface="Courier New" panose="02070309020205020404" pitchFamily="49" charset="0"/>
-            </a:endParaRPr>
+              <a:t>Components continued..</a:t>
+            </a:r>
           </a:p>
         </p:txBody>
       </p:sp>
@@ -9189,4 +9594,265 @@
   <a:objectDefaults/>
   <a:extraClrSchemeLst/>
 </a:theme>
+</file>
+
+<file path=ppt/theme/theme2.xml><?xml version="1.0" encoding="utf-8"?>
+<a:theme xmlns:a="http://schemas.openxmlformats.org/drawingml/2006/main" name="Office Theme">
+  <a:themeElements>
+    <a:clrScheme name="Office">
+      <a:dk1>
+        <a:sysClr val="windowText" lastClr="000000"/>
+      </a:dk1>
+      <a:lt1>
+        <a:sysClr val="window" lastClr="FFFFFF"/>
+      </a:lt1>
+      <a:dk2>
+        <a:srgbClr val="44546A"/>
+      </a:dk2>
+      <a:lt2>
+        <a:srgbClr val="E7E6E6"/>
+      </a:lt2>
+      <a:accent1>
+        <a:srgbClr val="5B9BD5"/>
+      </a:accent1>
+      <a:accent2>
+        <a:srgbClr val="ED7D31"/>
+      </a:accent2>
+      <a:accent3>
+        <a:srgbClr val="A5A5A5"/>
+      </a:accent3>
+      <a:accent4>
+        <a:srgbClr val="FFC000"/>
+      </a:accent4>
+      <a:accent5>
+        <a:srgbClr val="4472C4"/>
+      </a:accent5>
+      <a:accent6>
+        <a:srgbClr val="70AD47"/>
+      </a:accent6>
+      <a:hlink>
+        <a:srgbClr val="0563C1"/>
+      </a:hlink>
+      <a:folHlink>
+        <a:srgbClr val="954F72"/>
+      </a:folHlink>
+    </a:clrScheme>
+    <a:fontScheme name="Office">
+      <a:majorFont>
+        <a:latin typeface="Calibri Light" panose="020F0302020204030204"/>
+        <a:ea typeface=""/>
+        <a:cs typeface=""/>
+        <a:font script="Jpan" typeface="游ゴシック Light"/>
+        <a:font script="Hang" typeface="맑은 고딕"/>
+        <a:font script="Hans" typeface="等线 Light"/>
+        <a:font script="Hant" typeface="新細明體"/>
+        <a:font script="Arab" typeface="Times New Roman"/>
+        <a:font script="Hebr" typeface="Times New Roman"/>
+        <a:font script="Thai" typeface="Angsana New"/>
+        <a:font script="Ethi" typeface="Nyala"/>
+        <a:font script="Beng" typeface="Vrinda"/>
+        <a:font script="Gujr" typeface="Shruti"/>
+        <a:font script="Khmr" typeface="MoolBoran"/>
+        <a:font script="Knda" typeface="Tunga"/>
+        <a:font script="Guru" typeface="Raavi"/>
+        <a:font script="Cans" typeface="Euphemia"/>
+        <a:font script="Cher" typeface="Plantagenet Cherokee"/>
+        <a:font script="Yiii" typeface="Microsoft Yi Baiti"/>
+        <a:font script="Tibt" typeface="Microsoft Himalaya"/>
+        <a:font script="Thaa" typeface="MV Boli"/>
+        <a:font script="Deva" typeface="Mangal"/>
+        <a:font script="Telu" typeface="Gautami"/>
+        <a:font script="Taml" typeface="Latha"/>
+        <a:font script="Syrc" typeface="Estrangelo Edessa"/>
+        <a:font script="Orya" typeface="Kalinga"/>
+        <a:font script="Mlym" typeface="Kartika"/>
+        <a:font script="Laoo" typeface="DokChampa"/>
+        <a:font script="Sinh" typeface="Iskoola Pota"/>
+        <a:font script="Mong" typeface="Mongolian Baiti"/>
+        <a:font script="Viet" typeface="Times New Roman"/>
+        <a:font script="Uigh" typeface="Microsoft Uighur"/>
+        <a:font script="Geor" typeface="Sylfaen"/>
+      </a:majorFont>
+      <a:minorFont>
+        <a:latin typeface="Calibri" panose="020F0502020204030204"/>
+        <a:ea typeface=""/>
+        <a:cs typeface=""/>
+        <a:font script="Jpan" typeface="游ゴシック"/>
+        <a:font script="Hang" typeface="맑은 고딕"/>
+        <a:font script="Hans" typeface="等线"/>
+        <a:font script="Hant" typeface="新細明體"/>
+        <a:font script="Arab" typeface="Arial"/>
+        <a:font script="Hebr" typeface="Arial"/>
+        <a:font script="Thai" typeface="Cordia New"/>
+        <a:font script="Ethi" typeface="Nyala"/>
+        <a:font script="Beng" typeface="Vrinda"/>
+        <a:font script="Gujr" typeface="Shruti"/>
+        <a:font script="Khmr" typeface="DaunPenh"/>
+        <a:font script="Knda" typeface="Tunga"/>
+        <a:font script="Guru" typeface="Raavi"/>
+        <a:font script="Cans" typeface="Euphemia"/>
+        <a:font script="Cher" typeface="Plantagenet Cherokee"/>
+        <a:font script="Yiii" typeface="Microsoft Yi Baiti"/>
+        <a:font script="Tibt" typeface="Microsoft Himalaya"/>
+        <a:font script="Thaa" typeface="MV Boli"/>
+        <a:font script="Deva" typeface="Mangal"/>
+        <a:font script="Telu" typeface="Gautami"/>
+        <a:font script="Taml" typeface="Latha"/>
+        <a:font script="Syrc" typeface="Estrangelo Edessa"/>
+        <a:font script="Orya" typeface="Kalinga"/>
+        <a:font script="Mlym" typeface="Kartika"/>
+        <a:font script="Laoo" typeface="DokChampa"/>
+        <a:font script="Sinh" typeface="Iskoola Pota"/>
+        <a:font script="Mong" typeface="Mongolian Baiti"/>
+        <a:font script="Viet" typeface="Arial"/>
+        <a:font script="Uigh" typeface="Microsoft Uighur"/>
+        <a:font script="Geor" typeface="Sylfaen"/>
+      </a:minorFont>
+    </a:fontScheme>
+    <a:fmtScheme name="Office">
+      <a:fillStyleLst>
+        <a:solidFill>
+          <a:schemeClr val="phClr"/>
+        </a:solidFill>
+        <a:gradFill rotWithShape="1">
+          <a:gsLst>
+            <a:gs pos="0">
+              <a:schemeClr val="phClr">
+                <a:lumMod val="110000"/>
+                <a:satMod val="105000"/>
+                <a:tint val="67000"/>
+              </a:schemeClr>
+            </a:gs>
+            <a:gs pos="50000">
+              <a:schemeClr val="phClr">
+                <a:lumMod val="105000"/>
+                <a:satMod val="103000"/>
+                <a:tint val="73000"/>
+              </a:schemeClr>
+            </a:gs>
+            <a:gs pos="100000">
+              <a:schemeClr val="phClr">
+                <a:lumMod val="105000"/>
+                <a:satMod val="109000"/>
+                <a:tint val="81000"/>
+              </a:schemeClr>
+            </a:gs>
+          </a:gsLst>
+          <a:lin ang="5400000" scaled="0"/>
+        </a:gradFill>
+        <a:gradFill rotWithShape="1">
+          <a:gsLst>
+            <a:gs pos="0">
+              <a:schemeClr val="phClr">
+                <a:satMod val="103000"/>
+                <a:lumMod val="102000"/>
+                <a:tint val="94000"/>
+              </a:schemeClr>
+            </a:gs>
+            <a:gs pos="50000">
+              <a:schemeClr val="phClr">
+                <a:satMod val="110000"/>
+                <a:lumMod val="100000"/>
+                <a:shade val="100000"/>
+              </a:schemeClr>
+            </a:gs>
+            <a:gs pos="100000">
+              <a:schemeClr val="phClr">
+                <a:lumMod val="99000"/>
+                <a:satMod val="120000"/>
+                <a:shade val="78000"/>
+              </a:schemeClr>
+            </a:gs>
+          </a:gsLst>
+          <a:lin ang="5400000" scaled="0"/>
+        </a:gradFill>
+      </a:fillStyleLst>
+      <a:lnStyleLst>
+        <a:ln w="6350" cap="flat" cmpd="sng" algn="ctr">
+          <a:solidFill>
+            <a:schemeClr val="phClr"/>
+          </a:solidFill>
+          <a:prstDash val="solid"/>
+          <a:miter lim="800000"/>
+        </a:ln>
+        <a:ln w="12700" cap="flat" cmpd="sng" algn="ctr">
+          <a:solidFill>
+            <a:schemeClr val="phClr"/>
+          </a:solidFill>
+          <a:prstDash val="solid"/>
+          <a:miter lim="800000"/>
+        </a:ln>
+        <a:ln w="19050" cap="flat" cmpd="sng" algn="ctr">
+          <a:solidFill>
+            <a:schemeClr val="phClr"/>
+          </a:solidFill>
+          <a:prstDash val="solid"/>
+          <a:miter lim="800000"/>
+        </a:ln>
+      </a:lnStyleLst>
+      <a:effectStyleLst>
+        <a:effectStyle>
+          <a:effectLst/>
+        </a:effectStyle>
+        <a:effectStyle>
+          <a:effectLst/>
+        </a:effectStyle>
+        <a:effectStyle>
+          <a:effectLst>
+            <a:outerShdw blurRad="57150" dist="19050" dir="5400000" algn="ctr" rotWithShape="0">
+              <a:srgbClr val="000000">
+                <a:alpha val="63000"/>
+              </a:srgbClr>
+            </a:outerShdw>
+          </a:effectLst>
+        </a:effectStyle>
+      </a:effectStyleLst>
+      <a:bgFillStyleLst>
+        <a:solidFill>
+          <a:schemeClr val="phClr"/>
+        </a:solidFill>
+        <a:solidFill>
+          <a:schemeClr val="phClr">
+            <a:tint val="95000"/>
+            <a:satMod val="170000"/>
+          </a:schemeClr>
+        </a:solidFill>
+        <a:gradFill rotWithShape="1">
+          <a:gsLst>
+            <a:gs pos="0">
+              <a:schemeClr val="phClr">
+                <a:tint val="93000"/>
+                <a:satMod val="150000"/>
+                <a:shade val="98000"/>
+                <a:lumMod val="102000"/>
+              </a:schemeClr>
+            </a:gs>
+            <a:gs pos="50000">
+              <a:schemeClr val="phClr">
+                <a:tint val="98000"/>
+                <a:satMod val="130000"/>
+                <a:shade val="90000"/>
+                <a:lumMod val="103000"/>
+              </a:schemeClr>
+            </a:gs>
+            <a:gs pos="100000">
+              <a:schemeClr val="phClr">
+                <a:shade val="63000"/>
+                <a:satMod val="120000"/>
+              </a:schemeClr>
+            </a:gs>
+          </a:gsLst>
+          <a:lin ang="5400000" scaled="0"/>
+        </a:gradFill>
+      </a:bgFillStyleLst>
+    </a:fmtScheme>
+  </a:themeElements>
+  <a:objectDefaults/>
+  <a:extraClrSchemeLst/>
+  <a:extLst>
+    <a:ext uri="{05A4C25C-085E-4340-85A3-A5531E510DB2}">
+      <thm15:themeFamily xmlns:thm15="http://schemas.microsoft.com/office/thememl/2012/main" name="Office Theme" id="{62F939B6-93AF-4DB8-9C6B-D6C7DFDC589F}" vid="{4A3C46E8-61CC-4603-A589-7422A47A8E4A}"/>
+    </a:ext>
+  </a:extLst>
+</a:theme>
 </file>
</xml_diff>

<commit_message>
added referenses slide to Vue-js_team06.pptx
</commit_message>
<xml_diff>
--- a/Vue-js_team06.pptx
+++ b/Vue-js_team06.pptx
@@ -5,7 +5,7 @@
     <p:sldMasterId id="2147483648" r:id="rId1"/>
   </p:sldMasterIdLst>
   <p:notesMasterIdLst>
-    <p:notesMasterId r:id="rId21"/>
+    <p:notesMasterId r:id="rId22"/>
   </p:notesMasterIdLst>
   <p:sldIdLst>
     <p:sldId id="256" r:id="rId2"/>
@@ -26,7 +26,8 @@
     <p:sldId id="308" r:id="rId17"/>
     <p:sldId id="309" r:id="rId18"/>
     <p:sldId id="310" r:id="rId19"/>
-    <p:sldId id="312" r:id="rId20"/>
+    <p:sldId id="313" r:id="rId20"/>
+    <p:sldId id="312" r:id="rId21"/>
   </p:sldIdLst>
   <p:sldSz cx="9144000" cy="5143500" type="screen16x9"/>
   <p:notesSz cx="9144000" cy="5143500"/>
@@ -226,7 +227,7 @@
           <a:p>
             <a:fld id="{2CD817D8-1F7E-4730-8F3E-511AFD600A36}" type="datetimeFigureOut">
               <a:rPr lang="en-US" smtClean="0"/>
-              <a:t>10/28/2019</a:t>
+              <a:t>10/29/2019</a:t>
             </a:fld>
             <a:endParaRPr lang="en-US"/>
           </a:p>
@@ -717,7 +718,7 @@
           <a:p>
             <a:fld id="{1D8BD707-D9CF-40AE-B4C6-C98DA3205C09}" type="datetimeFigureOut">
               <a:rPr lang="en-US"/>
-              <a:t>10/28/2019</a:t>
+              <a:t>10/29/2019</a:t>
             </a:fld>
             <a:endParaRPr lang="en-US"/>
           </a:p>
@@ -979,7 +980,7 @@
           <a:p>
             <a:fld id="{1D8BD707-D9CF-40AE-B4C6-C98DA3205C09}" type="datetimeFigureOut">
               <a:rPr lang="en-US"/>
-              <a:t>10/28/2019</a:t>
+              <a:t>10/29/2019</a:t>
             </a:fld>
             <a:endParaRPr lang="en-US"/>
           </a:p>
@@ -1342,7 +1343,7 @@
           <a:p>
             <a:fld id="{1D8BD707-D9CF-40AE-B4C6-C98DA3205C09}" type="datetimeFigureOut">
               <a:rPr lang="en-US"/>
-              <a:t>10/28/2019</a:t>
+              <a:t>10/29/2019</a:t>
             </a:fld>
             <a:endParaRPr lang="en-US"/>
           </a:p>
@@ -1490,7 +1491,7 @@
           <a:p>
             <a:fld id="{1D8BD707-D9CF-40AE-B4C6-C98DA3205C09}" type="datetimeFigureOut">
               <a:rPr lang="en-US"/>
-              <a:t>10/28/2019</a:t>
+              <a:t>10/29/2019</a:t>
             </a:fld>
             <a:endParaRPr lang="en-US"/>
           </a:p>
@@ -1696,7 +1697,7 @@
           <a:p>
             <a:fld id="{1D8BD707-D9CF-40AE-B4C6-C98DA3205C09}" type="datetimeFigureOut">
               <a:rPr lang="en-US"/>
-              <a:t>10/28/2019</a:t>
+              <a:t>10/29/2019</a:t>
             </a:fld>
             <a:endParaRPr lang="en-US"/>
           </a:p>
@@ -1919,7 +1920,7 @@
           <a:p>
             <a:fld id="{1D8BD707-D9CF-40AE-B4C6-C98DA3205C09}" type="datetimeFigureOut">
               <a:rPr lang="en-US"/>
-              <a:t>10/28/2019</a:t>
+              <a:t>10/29/2019</a:t>
             </a:fld>
             <a:endParaRPr lang="en-US"/>
           </a:p>
@@ -5782,10 +5783,6 @@
               </a:rPr>
               <a:t>-text</a:t>
             </a:r>
-            <a:endParaRPr lang="en-US" altLang="en-US" sz="1400" dirty="0" smtClean="0">
-              <a:latin typeface="Verdana" panose="020B0604030504040204" pitchFamily="34" charset="0"/>
-              <a:ea typeface="Verdana" panose="020B0604030504040204" pitchFamily="34" charset="0"/>
-            </a:endParaRPr>
           </a:p>
           <a:p>
             <a:pPr marL="742950" lvl="1" indent="-285750" eaLnBrk="0" fontAlgn="base" hangingPunct="0">
@@ -5819,17 +5816,6 @@
               </a:rPr>
               <a:t>-ref</a:t>
             </a:r>
-            <a:endParaRPr kumimoji="0" lang="en-US" altLang="en-US" sz="1400" i="0" u="none" strike="noStrike" cap="none" normalizeH="0" baseline="0" dirty="0" smtClean="0">
-              <a:ln>
-                <a:noFill/>
-              </a:ln>
-              <a:solidFill>
-                <a:schemeClr val="tx1"/>
-              </a:solidFill>
-              <a:effectLst/>
-              <a:latin typeface="Verdana" panose="020B0604030504040204" pitchFamily="34" charset="0"/>
-              <a:ea typeface="Verdana" panose="020B0604030504040204" pitchFamily="34" charset="0"/>
-            </a:endParaRPr>
           </a:p>
           <a:p>
             <a:pPr marL="742950" lvl="1" indent="-285750" eaLnBrk="0" fontAlgn="base" hangingPunct="0">
@@ -5856,10 +5842,6 @@
               </a:rPr>
               <a:t>-transition</a:t>
             </a:r>
-            <a:endParaRPr lang="en-US" altLang="en-US" sz="1400" dirty="0" smtClean="0">
-              <a:latin typeface="Verdana" panose="020B0604030504040204" pitchFamily="34" charset="0"/>
-              <a:ea typeface="Verdana" panose="020B0604030504040204" pitchFamily="34" charset="0"/>
-            </a:endParaRPr>
           </a:p>
           <a:p>
             <a:pPr marL="742950" lvl="1" indent="-285750" eaLnBrk="0" fontAlgn="base" hangingPunct="0">
@@ -5893,17 +5875,6 @@
               </a:rPr>
               <a:t>-pre</a:t>
             </a:r>
-            <a:endParaRPr kumimoji="0" lang="en-US" altLang="en-US" sz="1400" i="0" u="none" strike="noStrike" cap="none" normalizeH="0" baseline="0" dirty="0" smtClean="0">
-              <a:ln>
-                <a:noFill/>
-              </a:ln>
-              <a:solidFill>
-                <a:schemeClr val="tx1"/>
-              </a:solidFill>
-              <a:effectLst/>
-              <a:latin typeface="Verdana" panose="020B0604030504040204" pitchFamily="34" charset="0"/>
-              <a:ea typeface="Verdana" panose="020B0604030504040204" pitchFamily="34" charset="0"/>
-            </a:endParaRPr>
           </a:p>
           <a:p>
             <a:pPr marL="742950" lvl="1" indent="-285750" eaLnBrk="0" fontAlgn="base" hangingPunct="0">
@@ -5930,10 +5901,6 @@
               </a:rPr>
               <a:t>-el</a:t>
             </a:r>
-            <a:endParaRPr lang="en-US" altLang="en-US" sz="1400" dirty="0" smtClean="0">
-              <a:latin typeface="Verdana" panose="020B0604030504040204" pitchFamily="34" charset="0"/>
-              <a:ea typeface="Verdana" panose="020B0604030504040204" pitchFamily="34" charset="0"/>
-            </a:endParaRPr>
           </a:p>
           <a:p>
             <a:pPr lvl="0" eaLnBrk="0" fontAlgn="base" hangingPunct="0">
@@ -6440,14 +6407,55 @@
       </p:grpSpPr>
       <p:sp>
         <p:nvSpPr>
-          <p:cNvPr id="2" name="TextBox 1"/>
+          <p:cNvPr id="3" name="Text Placeholder 2"/>
+          <p:cNvSpPr>
+            <a:spLocks noGrp="1"/>
+          </p:cNvSpPr>
+          <p:nvPr>
+            <p:ph type="body" idx="1"/>
+          </p:nvPr>
+        </p:nvSpPr>
+        <p:spPr>
+          <a:xfrm>
+            <a:off x="228600" y="285750"/>
+            <a:ext cx="8193502" cy="615553"/>
+          </a:xfrm>
+        </p:spPr>
+        <p:txBody>
+          <a:bodyPr/>
+          <a:lstStyle/>
+          <a:p>
+            <a:pPr lvl="0"/>
+            <a:r>
+              <a:rPr lang="en-US" sz="4000" spc="-450" dirty="0" smtClean="0">
+                <a:solidFill>
+                  <a:srgbClr val="4FBF8C"/>
+                </a:solidFill>
+                <a:latin typeface="Courier New" panose="02070309020205020404" pitchFamily="49" charset="0"/>
+                <a:cs typeface="Courier New" panose="02070309020205020404" pitchFamily="49" charset="0"/>
+              </a:rPr>
+              <a:t>References</a:t>
+            </a:r>
+            <a:endParaRPr lang="en-US" sz="4000" spc="-450" dirty="0">
+              <a:solidFill>
+                <a:srgbClr val="4FBF8C"/>
+              </a:solidFill>
+              <a:latin typeface="Courier New" panose="02070309020205020404" pitchFamily="49" charset="0"/>
+              <a:cs typeface="Courier New" panose="02070309020205020404" pitchFamily="49" charset="0"/>
+            </a:endParaRPr>
+          </a:p>
+        </p:txBody>
+      </p:sp>
+      <p:sp>
+        <p:nvSpPr>
+          <p:cNvPr id="4" name="TextBox 3"/>
           <p:cNvSpPr txBox="1"/>
           <p:nvPr/>
         </p:nvSpPr>
         <p:spPr>
           <a:xfrm>
-            <a:off x="1143000" y="755630"/>
-            <a:ext cx="6553200" cy="3416320"/>
+            <a:off x="228600" y="1352550"/>
+            <a:ext cx="7924800" cy="2585323"/>
           </a:xfrm>
           <a:prstGeom prst="rect">
             <a:avLst/>
@@ -6460,52 +6468,143 @@
           </a:bodyPr>
           <a:lstStyle/>
           <a:p>
-            <a:pPr algn="ctr"/>
-            <a:r>
-              <a:rPr lang="en-US" sz="5400" spc="-450" dirty="0">
-                <a:solidFill>
-                  <a:srgbClr val="4FBF8C"/>
-                </a:solidFill>
-                <a:latin typeface="Courier New" panose="02070309020205020404" pitchFamily="49" charset="0"/>
-                <a:ea typeface="+mj-ea"/>
-                <a:cs typeface="Courier New" panose="02070309020205020404" pitchFamily="49" charset="0"/>
-              </a:rPr>
-              <a:t>Thanks for bearing with us. </a:t>
-            </a:r>
-          </a:p>
-          <a:p>
-            <a:pPr algn="ctr"/>
-            <a:r>
-              <a:rPr lang="en-US" sz="5400" spc="-450" dirty="0">
-                <a:solidFill>
-                  <a:srgbClr val="4FBF8C"/>
-                </a:solidFill>
-                <a:latin typeface="Courier New" panose="02070309020205020404" pitchFamily="49" charset="0"/>
-                <a:ea typeface="+mj-ea"/>
-                <a:cs typeface="Courier New" panose="02070309020205020404" pitchFamily="49" charset="0"/>
-              </a:rPr>
-              <a:t>Your feedback is valuable</a:t>
-            </a:r>
+            <a:pPr marL="342900" indent="-342900">
+              <a:buFont typeface="+mj-lt"/>
+              <a:buAutoNum type="arabicPeriod"/>
+            </a:pPr>
+            <a:r>
+              <a:rPr lang="en-US" dirty="0">
+                <a:latin typeface="Verdana" panose="020B0604030504040204" pitchFamily="34" charset="0"/>
+                <a:ea typeface="Verdana" panose="020B0604030504040204" pitchFamily="34" charset="0"/>
+                <a:hlinkClick r:id="rId2"/>
+              </a:rPr>
+              <a:t>https://vuejs.org</a:t>
+            </a:r>
+            <a:r>
+              <a:rPr lang="en-US" dirty="0" smtClean="0">
+                <a:latin typeface="Verdana" panose="020B0604030504040204" pitchFamily="34" charset="0"/>
+                <a:ea typeface="Verdana" panose="020B0604030504040204" pitchFamily="34" charset="0"/>
+                <a:hlinkClick r:id="rId2"/>
+              </a:rPr>
+              <a:t>/</a:t>
+            </a:r>
+            <a:endParaRPr lang="en-US" dirty="0" smtClean="0">
+              <a:latin typeface="Verdana" panose="020B0604030504040204" pitchFamily="34" charset="0"/>
+              <a:ea typeface="Verdana" panose="020B0604030504040204" pitchFamily="34" charset="0"/>
+            </a:endParaRPr>
+          </a:p>
+          <a:p>
+            <a:pPr marL="342900" indent="-342900">
+              <a:buFont typeface="+mj-lt"/>
+              <a:buAutoNum type="arabicPeriod"/>
+            </a:pPr>
+            <a:endParaRPr lang="en-US" dirty="0" smtClean="0">
+              <a:latin typeface="Verdana" panose="020B0604030504040204" pitchFamily="34" charset="0"/>
+              <a:ea typeface="Verdana" panose="020B0604030504040204" pitchFamily="34" charset="0"/>
+            </a:endParaRPr>
+          </a:p>
+          <a:p>
+            <a:pPr marL="342900" indent="-342900">
+              <a:buFont typeface="+mj-lt"/>
+              <a:buAutoNum type="arabicPeriod"/>
+            </a:pPr>
+            <a:r>
+              <a:rPr lang="en-US" dirty="0">
+                <a:latin typeface="Verdana" panose="020B0604030504040204" pitchFamily="34" charset="0"/>
+                <a:ea typeface="Verdana" panose="020B0604030504040204" pitchFamily="34" charset="0"/>
+                <a:hlinkClick r:id="rId3"/>
+              </a:rPr>
+              <a:t>https://</a:t>
+            </a:r>
+            <a:r>
+              <a:rPr lang="en-US" dirty="0" smtClean="0">
+                <a:latin typeface="Verdana" panose="020B0604030504040204" pitchFamily="34" charset="0"/>
+                <a:ea typeface="Verdana" panose="020B0604030504040204" pitchFamily="34" charset="0"/>
+                <a:hlinkClick r:id="rId3"/>
+              </a:rPr>
+              <a:t>v1.vuejs.org/guide/syntax.html</a:t>
+            </a:r>
+            <a:endParaRPr lang="en-US" dirty="0" smtClean="0">
+              <a:latin typeface="Verdana" panose="020B0604030504040204" pitchFamily="34" charset="0"/>
+              <a:ea typeface="Verdana" panose="020B0604030504040204" pitchFamily="34" charset="0"/>
+            </a:endParaRPr>
+          </a:p>
+          <a:p>
+            <a:pPr marL="342900" indent="-342900">
+              <a:buFont typeface="+mj-lt"/>
+              <a:buAutoNum type="arabicPeriod"/>
+            </a:pPr>
+            <a:endParaRPr lang="en-US" dirty="0" smtClean="0">
+              <a:latin typeface="Verdana" panose="020B0604030504040204" pitchFamily="34" charset="0"/>
+              <a:ea typeface="Verdana" panose="020B0604030504040204" pitchFamily="34" charset="0"/>
+            </a:endParaRPr>
+          </a:p>
+          <a:p>
+            <a:pPr marL="342900" indent="-342900">
+              <a:buFont typeface="+mj-lt"/>
+              <a:buAutoNum type="arabicPeriod"/>
+            </a:pPr>
+            <a:r>
+              <a:rPr lang="en-US" dirty="0">
+                <a:latin typeface="Verdana" panose="020B0604030504040204" pitchFamily="34" charset="0"/>
+                <a:ea typeface="Verdana" panose="020B0604030504040204" pitchFamily="34" charset="0"/>
+                <a:hlinkClick r:id="rId4"/>
+              </a:rPr>
+              <a:t>https://</a:t>
+            </a:r>
+            <a:r>
+              <a:rPr lang="en-US" dirty="0" smtClean="0">
+                <a:latin typeface="Verdana" panose="020B0604030504040204" pitchFamily="34" charset="0"/>
+                <a:ea typeface="Verdana" panose="020B0604030504040204" pitchFamily="34" charset="0"/>
+                <a:hlinkClick r:id="rId4"/>
+              </a:rPr>
+              <a:t>github.com/denisecase/js-gui-vue</a:t>
+            </a:r>
+            <a:endParaRPr lang="en-US" dirty="0" smtClean="0">
+              <a:latin typeface="Verdana" panose="020B0604030504040204" pitchFamily="34" charset="0"/>
+              <a:ea typeface="Verdana" panose="020B0604030504040204" pitchFamily="34" charset="0"/>
+            </a:endParaRPr>
+          </a:p>
+          <a:p>
+            <a:pPr marL="342900" indent="-342900">
+              <a:buFont typeface="+mj-lt"/>
+              <a:buAutoNum type="arabicPeriod"/>
+            </a:pPr>
+            <a:endParaRPr lang="en-US" dirty="0" smtClean="0">
+              <a:latin typeface="Verdana" panose="020B0604030504040204" pitchFamily="34" charset="0"/>
+              <a:ea typeface="Verdana" panose="020B0604030504040204" pitchFamily="34" charset="0"/>
+            </a:endParaRPr>
+          </a:p>
+          <a:p>
+            <a:pPr marL="342900" indent="-342900">
+              <a:buFont typeface="+mj-lt"/>
+              <a:buAutoNum type="arabicPeriod"/>
+            </a:pPr>
+            <a:r>
+              <a:rPr lang="en-US" dirty="0">
+                <a:latin typeface="Verdana" panose="020B0604030504040204" pitchFamily="34" charset="0"/>
+                <a:ea typeface="Verdana" panose="020B0604030504040204" pitchFamily="34" charset="0"/>
+                <a:hlinkClick r:id="rId5"/>
+              </a:rPr>
+              <a:t>https://docs.google.com/presentation/d/1a2JwLOXVX2-A_wDDyFt3lFqqfYQXNni7eVLkkKO7AqA/edit#slide=id.g647ae5a787_4_19</a:t>
+            </a:r>
+            <a:endParaRPr lang="en-US" dirty="0">
+              <a:latin typeface="Verdana" panose="020B0604030504040204" pitchFamily="34" charset="0"/>
+              <a:ea typeface="Verdana" panose="020B0604030504040204" pitchFamily="34" charset="0"/>
+            </a:endParaRPr>
           </a:p>
         </p:txBody>
       </p:sp>
     </p:spTree>
     <p:extLst>
       <p:ext uri="{BB962C8B-B14F-4D97-AF65-F5344CB8AC3E}">
-        <p14:creationId xmlns:p14="http://schemas.microsoft.com/office/powerpoint/2010/main" val="3500469158"/>
+        <p14:creationId xmlns:p14="http://schemas.microsoft.com/office/powerpoint/2010/main" val="2121485284"/>
       </p:ext>
     </p:extLst>
   </p:cSld>
   <p:clrMapOvr>
     <a:masterClrMapping/>
   </p:clrMapOvr>
-  <p:timing>
-    <p:tnLst>
-      <p:par>
-        <p:cTn id="1" dur="indefinite" restart="never" nodeType="tmRoot"/>
-      </p:par>
-    </p:tnLst>
-  </p:timing>
 </p:sld>
 </file>
 
@@ -7034,6 +7133,94 @@
         </p:spPr>
       </p:pic>
     </p:spTree>
+  </p:cSld>
+  <p:clrMapOvr>
+    <a:masterClrMapping/>
+  </p:clrMapOvr>
+  <p:timing>
+    <p:tnLst>
+      <p:par>
+        <p:cTn id="1" dur="indefinite" restart="never" nodeType="tmRoot"/>
+      </p:par>
+    </p:tnLst>
+  </p:timing>
+</p:sld>
+</file>
+
+<file path=ppt/slides/slide20.xml><?xml version="1.0" encoding="utf-8"?>
+<p:sld xmlns:a="http://schemas.openxmlformats.org/drawingml/2006/main" xmlns:r="http://schemas.openxmlformats.org/officeDocument/2006/relationships" xmlns:p="http://schemas.openxmlformats.org/presentationml/2006/main">
+  <p:cSld>
+    <p:spTree>
+      <p:nvGrpSpPr>
+        <p:cNvPr id="1" name=""/>
+        <p:cNvGrpSpPr/>
+        <p:nvPr/>
+      </p:nvGrpSpPr>
+      <p:grpSpPr>
+        <a:xfrm>
+          <a:off x="0" y="0"/>
+          <a:ext cx="0" cy="0"/>
+          <a:chOff x="0" y="0"/>
+          <a:chExt cx="0" cy="0"/>
+        </a:xfrm>
+      </p:grpSpPr>
+      <p:sp>
+        <p:nvSpPr>
+          <p:cNvPr id="2" name="TextBox 1"/>
+          <p:cNvSpPr txBox="1"/>
+          <p:nvPr/>
+        </p:nvSpPr>
+        <p:spPr>
+          <a:xfrm>
+            <a:off x="1143000" y="755630"/>
+            <a:ext cx="6553200" cy="3416320"/>
+          </a:xfrm>
+          <a:prstGeom prst="rect">
+            <a:avLst/>
+          </a:prstGeom>
+          <a:noFill/>
+        </p:spPr>
+        <p:txBody>
+          <a:bodyPr wrap="square" rtlCol="0">
+            <a:spAutoFit/>
+          </a:bodyPr>
+          <a:lstStyle/>
+          <a:p>
+            <a:pPr algn="ctr"/>
+            <a:r>
+              <a:rPr lang="en-US" sz="5400" spc="-450" dirty="0">
+                <a:solidFill>
+                  <a:srgbClr val="4FBF8C"/>
+                </a:solidFill>
+                <a:latin typeface="Courier New" panose="02070309020205020404" pitchFamily="49" charset="0"/>
+                <a:ea typeface="+mj-ea"/>
+                <a:cs typeface="Courier New" panose="02070309020205020404" pitchFamily="49" charset="0"/>
+              </a:rPr>
+              <a:t>Thanks for bearing with us. </a:t>
+            </a:r>
+          </a:p>
+          <a:p>
+            <a:pPr algn="ctr"/>
+            <a:r>
+              <a:rPr lang="en-US" sz="5400" spc="-450" dirty="0">
+                <a:solidFill>
+                  <a:srgbClr val="4FBF8C"/>
+                </a:solidFill>
+                <a:latin typeface="Courier New" panose="02070309020205020404" pitchFamily="49" charset="0"/>
+                <a:ea typeface="+mj-ea"/>
+                <a:cs typeface="Courier New" panose="02070309020205020404" pitchFamily="49" charset="0"/>
+              </a:rPr>
+              <a:t>Your feedback is valuable</a:t>
+            </a:r>
+          </a:p>
+        </p:txBody>
+      </p:sp>
+    </p:spTree>
+    <p:extLst>
+      <p:ext uri="{BB962C8B-B14F-4D97-AF65-F5344CB8AC3E}">
+        <p14:creationId xmlns:p14="http://schemas.microsoft.com/office/powerpoint/2010/main" val="3500469158"/>
+      </p:ext>
+    </p:extLst>
   </p:cSld>
   <p:clrMapOvr>
     <a:masterClrMapping/>

</xml_diff>